<commit_message>
Changed some stuff on functional spec reworded and change use case the alert one
</commit_message>
<xml_diff>
--- a/Documents/Research Poster.pptx
+++ b/Documents/Research Poster.pptx
@@ -206,7 +206,7 @@
           <a:p>
             <a:fld id="{AED6AE0B-7495-4AEA-A05C-11E53CFEC7F1}" type="datetimeFigureOut">
               <a:rPr lang="en-IE" smtClean="0"/>
-              <a:t>25/10/2024</a:t>
+              <a:t>05/12/2024</a:t>
             </a:fld>
             <a:endParaRPr lang="en-IE"/>
           </a:p>
@@ -1280,7 +1280,7 @@
           <a:p>
             <a:fld id="{02AC24A9-CCB6-4F8D-B8DB-C2F3692CFA5A}" type="datetimeFigureOut">
               <a:rPr lang="en-US" smtClean="0"/>
-              <a:t>10/25/2024</a:t>
+              <a:t>12/5/2024</a:t>
             </a:fld>
             <a:endParaRPr lang="en-US" dirty="0"/>
           </a:p>
@@ -1531,7 +1531,7 @@
           <a:p>
             <a:fld id="{02AC24A9-CCB6-4F8D-B8DB-C2F3692CFA5A}" type="datetimeFigureOut">
               <a:rPr lang="en-US" smtClean="0"/>
-              <a:t>10/25/2024</a:t>
+              <a:t>12/5/2024</a:t>
             </a:fld>
             <a:endParaRPr lang="en-US"/>
           </a:p>
@@ -1845,7 +1845,7 @@
           <a:p>
             <a:fld id="{02AC24A9-CCB6-4F8D-B8DB-C2F3692CFA5A}" type="datetimeFigureOut">
               <a:rPr lang="en-US" smtClean="0"/>
-              <a:t>10/25/2024</a:t>
+              <a:t>12/5/2024</a:t>
             </a:fld>
             <a:endParaRPr lang="en-US"/>
           </a:p>
@@ -2186,7 +2186,7 @@
           <a:p>
             <a:fld id="{02AC24A9-CCB6-4F8D-B8DB-C2F3692CFA5A}" type="datetimeFigureOut">
               <a:rPr lang="en-US" smtClean="0"/>
-              <a:t>10/25/2024</a:t>
+              <a:t>12/5/2024</a:t>
             </a:fld>
             <a:endParaRPr lang="en-US"/>
           </a:p>
@@ -2500,7 +2500,7 @@
           <a:p>
             <a:fld id="{02AC24A9-CCB6-4F8D-B8DB-C2F3692CFA5A}" type="datetimeFigureOut">
               <a:rPr lang="en-US" smtClean="0"/>
-              <a:t>10/25/2024</a:t>
+              <a:t>12/5/2024</a:t>
             </a:fld>
             <a:endParaRPr lang="en-US"/>
           </a:p>
@@ -2893,7 +2893,7 @@
           <a:p>
             <a:fld id="{02AC24A9-CCB6-4F8D-B8DB-C2F3692CFA5A}" type="datetimeFigureOut">
               <a:rPr lang="en-US" smtClean="0"/>
-              <a:t>10/25/2024</a:t>
+              <a:t>12/5/2024</a:t>
             </a:fld>
             <a:endParaRPr lang="en-US"/>
           </a:p>
@@ -3063,7 +3063,7 @@
           <a:p>
             <a:fld id="{02AC24A9-CCB6-4F8D-B8DB-C2F3692CFA5A}" type="datetimeFigureOut">
               <a:rPr lang="en-US" smtClean="0"/>
-              <a:t>10/25/2024</a:t>
+              <a:t>12/5/2024</a:t>
             </a:fld>
             <a:endParaRPr lang="en-US"/>
           </a:p>
@@ -3243,7 +3243,7 @@
           <a:p>
             <a:fld id="{02AC24A9-CCB6-4F8D-B8DB-C2F3692CFA5A}" type="datetimeFigureOut">
               <a:rPr lang="en-US" smtClean="0"/>
-              <a:t>10/25/2024</a:t>
+              <a:t>12/5/2024</a:t>
             </a:fld>
             <a:endParaRPr lang="en-US"/>
           </a:p>
@@ -3419,7 +3419,7 @@
           <a:p>
             <a:fld id="{02AC24A9-CCB6-4F8D-B8DB-C2F3692CFA5A}" type="datetimeFigureOut">
               <a:rPr lang="en-US" smtClean="0"/>
-              <a:t>10/25/2024</a:t>
+              <a:t>12/5/2024</a:t>
             </a:fld>
             <a:endParaRPr lang="en-US"/>
           </a:p>
@@ -3666,7 +3666,7 @@
           <a:p>
             <a:fld id="{02AC24A9-CCB6-4F8D-B8DB-C2F3692CFA5A}" type="datetimeFigureOut">
               <a:rPr lang="en-US" smtClean="0"/>
-              <a:t>10/25/2024</a:t>
+              <a:t>12/5/2024</a:t>
             </a:fld>
             <a:endParaRPr lang="en-US"/>
           </a:p>
@@ -3898,7 +3898,7 @@
           <a:p>
             <a:fld id="{02AC24A9-CCB6-4F8D-B8DB-C2F3692CFA5A}" type="datetimeFigureOut">
               <a:rPr lang="en-US" smtClean="0"/>
-              <a:t>10/25/2024</a:t>
+              <a:t>12/5/2024</a:t>
             </a:fld>
             <a:endParaRPr lang="en-US"/>
           </a:p>
@@ -4272,7 +4272,7 @@
           <a:p>
             <a:fld id="{02AC24A9-CCB6-4F8D-B8DB-C2F3692CFA5A}" type="datetimeFigureOut">
               <a:rPr lang="en-US" smtClean="0"/>
-              <a:t>10/25/2024</a:t>
+              <a:t>12/5/2024</a:t>
             </a:fld>
             <a:endParaRPr lang="en-US"/>
           </a:p>
@@ -4395,7 +4395,7 @@
           <a:p>
             <a:fld id="{02AC24A9-CCB6-4F8D-B8DB-C2F3692CFA5A}" type="datetimeFigureOut">
               <a:rPr lang="en-US" smtClean="0"/>
-              <a:t>10/25/2024</a:t>
+              <a:t>12/5/2024</a:t>
             </a:fld>
             <a:endParaRPr lang="en-US"/>
           </a:p>
@@ -4490,7 +4490,7 @@
           <a:p>
             <a:fld id="{02AC24A9-CCB6-4F8D-B8DB-C2F3692CFA5A}" type="datetimeFigureOut">
               <a:rPr lang="en-US" smtClean="0"/>
-              <a:t>10/25/2024</a:t>
+              <a:t>12/5/2024</a:t>
             </a:fld>
             <a:endParaRPr lang="en-US"/>
           </a:p>
@@ -4745,7 +4745,7 @@
           <a:p>
             <a:fld id="{02AC24A9-CCB6-4F8D-B8DB-C2F3692CFA5A}" type="datetimeFigureOut">
               <a:rPr lang="en-US" smtClean="0"/>
-              <a:t>10/25/2024</a:t>
+              <a:t>12/5/2024</a:t>
             </a:fld>
             <a:endParaRPr lang="en-US" dirty="0"/>
           </a:p>
@@ -5008,7 +5008,7 @@
           <a:p>
             <a:fld id="{02AC24A9-CCB6-4F8D-B8DB-C2F3692CFA5A}" type="datetimeFigureOut">
               <a:rPr lang="en-US" smtClean="0"/>
-              <a:t>10/25/2024</a:t>
+              <a:t>12/5/2024</a:t>
             </a:fld>
             <a:endParaRPr lang="en-US"/>
           </a:p>
@@ -5756,7 +5756,7 @@
           <a:p>
             <a:fld id="{02AC24A9-CCB6-4F8D-B8DB-C2F3692CFA5A}" type="datetimeFigureOut">
               <a:rPr lang="en-US" smtClean="0"/>
-              <a:t>10/25/2024</a:t>
+              <a:t>12/5/2024</a:t>
             </a:fld>
             <a:endParaRPr lang="en-US"/>
           </a:p>
@@ -6362,7 +6362,14 @@
                 <a:latin typeface="Times New Roman" panose="02020603050405020304" pitchFamily="18" charset="0"/>
                 <a:cs typeface="Times New Roman" panose="02020603050405020304" pitchFamily="18" charset="0"/>
               </a:rPr>
-              <a:t>By Qadeer Hussain  Date: 25/10/2024</a:t>
+              <a:t>By Qadeer Hussain  Date</a:t>
+            </a:r>
+            <a:r>
+              <a:rPr lang="en-IE" sz="2400">
+                <a:latin typeface="Times New Roman" panose="02020603050405020304" pitchFamily="18" charset="0"/>
+                <a:cs typeface="Times New Roman" panose="02020603050405020304" pitchFamily="18" charset="0"/>
+              </a:rPr>
+              <a:t>: 06/12/2024</a:t>
             </a:r>
             <a:endParaRPr lang="en-IE" sz="2800" dirty="0">
               <a:latin typeface="Times New Roman" panose="02020603050405020304" pitchFamily="18" charset="0"/>
@@ -6480,7 +6487,7 @@
                 <a:latin typeface="Times New Roman" panose="02020603050405020304" pitchFamily="18" charset="0"/>
                 <a:cs typeface="Times New Roman" panose="02020603050405020304" pitchFamily="18" charset="0"/>
               </a:rPr>
-              <a:t>Implementing Security</a:t>
+              <a:t>Security Implementation</a:t>
             </a:r>
           </a:p>
           <a:p>

</xml_diff>